<commit_message>
changed 200 to 100 ms
</commit_message>
<xml_diff>
--- a/99_Thinktank/Talks/21-12-07_Kolloquium/CERED_Presentation.pptx
+++ b/99_Thinktank/Talks/21-12-07_Kolloquium/CERED_Presentation.pptx
@@ -3591,11 +3591,7 @@
           <a:p>
             <a:r>
               <a:rPr lang="en-GB" dirty="0" smtClean="0"/>
-              <a:t>3. The study: Results of the pilot session </a:t>
-            </a:r>
-            <a:r>
-              <a:rPr lang="en-GB" dirty="0" smtClean="0"/>
-              <a:t>2</a:t>
+              <a:t>3. The study: Results of the pilot session 2</a:t>
             </a:r>
             <a:endParaRPr lang="en-GB" dirty="0"/>
           </a:p>
@@ -3634,7 +3630,6 @@
               <a:rPr lang="en-GB" sz="1400" u="sng" dirty="0" smtClean="0"/>
               <a:t>ER: Effort</a:t>
             </a:r>
-            <a:endParaRPr lang="en-GB" sz="1400" u="sng" dirty="0" smtClean="0"/>
           </a:p>
           <a:p>
             <a:pPr marL="285750" indent="-285750">
@@ -3735,7 +3730,6 @@
               <a:rPr lang="en-GB" sz="1400" dirty="0" smtClean="0"/>
               <a:t> war</a:t>
             </a:r>
-            <a:endParaRPr lang="en-GB" sz="1400" dirty="0" smtClean="0"/>
           </a:p>
           <a:p>
             <a:endParaRPr lang="en-GB" sz="1400" u="sng" dirty="0" smtClean="0"/>
@@ -3796,11 +3790,7 @@
           <a:p>
             <a:r>
               <a:rPr lang="en-GB" dirty="0" smtClean="0"/>
-              <a:t>3. The study: Results of the pilot session </a:t>
-            </a:r>
-            <a:r>
-              <a:rPr lang="en-GB" dirty="0" smtClean="0"/>
-              <a:t>2</a:t>
+              <a:t>3. The study: Results of the pilot session 2</a:t>
             </a:r>
             <a:endParaRPr lang="en-GB" dirty="0"/>
           </a:p>
@@ -15567,12 +15557,20 @@
           <a:p>
             <a:pPr algn="ctr"/>
             <a:r>
+              <a:rPr lang="en-GB" sz="1200" dirty="0">
+                <a:solidFill>
+                  <a:schemeClr val="tx1"/>
+                </a:solidFill>
+              </a:rPr>
+              <a:t>1</a:t>
+            </a:r>
+            <a:r>
               <a:rPr lang="en-GB" sz="1200" dirty="0" smtClean="0">
                 <a:solidFill>
                   <a:schemeClr val="tx1"/>
                 </a:solidFill>
               </a:rPr>
-              <a:t>200 </a:t>
+              <a:t>00 </a:t>
             </a:r>
             <a:r>
               <a:rPr lang="en-GB" sz="1200" dirty="0" err="1" smtClean="0">

</xml_diff>